<commit_message>
Added videos cli tool usage
</commit_message>
<xml_diff>
--- a/presentation/CYBERSEC.pptx
+++ b/presentation/CYBERSEC.pptx
@@ -1094,7 +1094,7 @@
         <p:spPr bwMode="auto">
           <a:xfrm>
             <a:off x="6416040" y="4434840"/>
-            <a:ext cx="4941771" cy="1122202"/>
+            <a:ext cx="4941770" cy="1122202"/>
           </a:xfrm>
         </p:spPr>
         <p:txBody>
@@ -1209,7 +1209,7 @@
         </p:blipFill>
         <p:spPr bwMode="auto">
           <a:xfrm>
-            <a:off x="-2864520" y="0"/>
+            <a:off x="-2864519" y="0"/>
             <a:ext cx="9488312" cy="5054322"/>
           </a:xfrm>
           <a:prstGeom prst="rect">
@@ -3807,9 +3807,9 @@
         <p:grpSpPr bwMode="auto">
           <a:xfrm>
             <a:off x="0" y="0"/>
-            <a:ext cx="4762501" cy="5186363"/>
+            <a:ext cx="4762500" cy="5186363"/>
             <a:chOff x="0" y="0"/>
-            <a:chExt cx="4762501" cy="5186363"/>
+            <a:chExt cx="4762500" cy="5186363"/>
           </a:xfrm>
         </p:grpSpPr>
         <p:cxnSp>
@@ -4323,7 +4323,7 @@
               </a:ext>
             </a:extLst>
           </a:blip>
-          <a:srcRect l="0" t="18301" r="28341" b="23070"/>
+          <a:srcRect l="0" t="18301" r="28341" b="23069"/>
           <a:stretch/>
         </p:blipFill>
         <p:spPr bwMode="auto">
@@ -9547,7 +9547,7 @@
         <p:spPr bwMode="auto">
           <a:xfrm>
             <a:off x="1429796" y="543591"/>
-            <a:ext cx="2895599" cy="574357"/>
+            <a:ext cx="2895598" cy="574357"/>
           </a:xfrm>
           <a:prstGeom prst="rect">
             <a:avLst/>
@@ -10230,7 +10230,7 @@
         <p:spPr bwMode="auto">
           <a:xfrm flipH="0" flipV="0">
             <a:off x="6283471" y="1483282"/>
-            <a:ext cx="623875" cy="626618"/>
+            <a:ext cx="623875" cy="626617"/>
           </a:xfrm>
           <a:prstGeom prst="rect">
             <a:avLst/>
@@ -10382,7 +10382,7 @@
         </p:nvSpPr>
         <p:spPr bwMode="auto">
           <a:xfrm flipH="0" flipV="0">
-            <a:off x="1790444" y="1751998"/>
+            <a:off x="1790443" y="1751998"/>
             <a:ext cx="1460721" cy="390525"/>
           </a:xfrm>
           <a:prstGeom prst="rect">
@@ -10534,7 +10534,7 @@
         </p:nvSpPr>
         <p:spPr bwMode="auto">
           <a:xfrm rot="0" flipH="0" flipV="0">
-            <a:off x="5305730" y="3684537"/>
+            <a:off x="5305730" y="3684536"/>
             <a:ext cx="2340000" cy="360000"/>
           </a:xfrm>
           <a:prstGeom prst="rect">
@@ -10759,7 +10759,7 @@
         </p:nvSpPr>
         <p:spPr bwMode="auto">
           <a:xfrm rot="0" flipH="0" flipV="0">
-            <a:off x="5305731" y="3684537"/>
+            <a:off x="5305731" y="3684536"/>
             <a:ext cx="2340000" cy="360000"/>
           </a:xfrm>
           <a:prstGeom prst="rect">
@@ -10901,7 +10901,7 @@
         </p:nvSpPr>
         <p:spPr bwMode="auto">
           <a:xfrm flipH="0" flipV="0">
-            <a:off x="1790444" y="1751998"/>
+            <a:off x="1790443" y="1751998"/>
             <a:ext cx="1460722" cy="390525"/>
           </a:xfrm>
           <a:prstGeom prst="rect">
@@ -11583,7 +11583,7 @@
         </p:nvSpPr>
         <p:spPr bwMode="auto">
           <a:xfrm flipH="0" flipV="0">
-            <a:off x="5202741" y="4879279"/>
+            <a:off x="5202740" y="4879279"/>
             <a:ext cx="1786517" cy="369331"/>
           </a:xfrm>
           <a:prstGeom prst="rect">
@@ -11621,7 +11621,7 @@
         </p:nvSpPr>
         <p:spPr bwMode="auto">
           <a:xfrm flipH="0" flipV="0">
-            <a:off x="5202741" y="5962976"/>
+            <a:off x="5202740" y="5962976"/>
             <a:ext cx="1786517" cy="369331"/>
           </a:xfrm>
           <a:prstGeom prst="rect">
@@ -12003,7 +12003,7 @@
           <p:nvPr/>
         </p:nvCxnSpPr>
         <p:spPr bwMode="auto">
-          <a:xfrm rot="5399978" flipH="0" flipV="1">
+          <a:xfrm rot="5399977" flipH="0" flipV="1">
             <a:off x="5219904" y="3421582"/>
             <a:ext cx="1752188" cy="0"/>
           </a:xfrm>
@@ -12381,11 +12381,20 @@
       </p:pic>
       <p:pic>
         <p:nvPicPr>
-          <p:cNvPr id="858641036" name=""/>
+          <p:cNvPr id="1741325779" name="">
+            <a:hlinkClick r:id="" action="ppaction://media"/>
+          </p:cNvPr>
           <p:cNvPicPr>
             <a:picLocks noChangeAspect="1"/>
           </p:cNvPicPr>
-          <p:nvPr/>
+          <p:nvPr>
+            <a:videoFile r:link="rId6"/>
+            <p:extLst>
+              <p:ext uri="{DAA4B4D4-6D71-4841-9C94-3DE7FCFB9230}">
+                <p14:media xmlns:p14="http://schemas.microsoft.com/office/powerpoint/2010/main" r:embed="rId5"/>
+              </p:ext>
+            </p:extLst>
+          </p:nvPr>
         </p:nvPicPr>
         <p:blipFill>
           <a:blip r:embed="rId4"/>
@@ -12393,8 +12402,8 @@
         </p:blipFill>
         <p:spPr bwMode="auto">
           <a:xfrm flipH="0" flipV="0">
-            <a:off x="1611749" y="1471579"/>
-            <a:ext cx="8690250" cy="4348195"/>
+            <a:off x="2709043" y="1536161"/>
+            <a:ext cx="6321985" cy="4600926"/>
           </a:xfrm>
           <a:prstGeom prst="rect">
             <a:avLst/>
@@ -12521,7 +12530,7 @@
         </p:nvSpPr>
         <p:spPr bwMode="auto">
           <a:xfrm flipH="0" flipV="0">
-            <a:off x="8274535" y="3603564"/>
+            <a:off x="8274534" y="3603564"/>
             <a:ext cx="1865210" cy="405124"/>
           </a:xfrm>
           <a:prstGeom prst="rect">
@@ -12979,349 +12988,4 @@
   </a:themeElements>
   <a:objectDefaults/>
 </a:theme>
-</file>
-
-<file path=customXml/item1.xml><?xml version="1.0" encoding="utf-8"?>
-<ct:contentTypeSchema xmlns:ct="http://schemas.microsoft.com/office/2006/metadata/contentType" xmlns:ma="http://schemas.microsoft.com/office/2006/metadata/properties/metaAttributes" ct:_="" ma:_="" ma:contentTypeName="Document" ma:contentTypeID="0x01010079F111ED35F8CC479449609E8A0923A6" ma:contentTypeVersion="20" ma:contentTypeDescription="Create a new document." ma:contentTypeScope="" ma:versionID="1267097ee5f5874adfcc408041ae252e">
-  <xsd:schema xmlns:xsd="http://www.w3.org/2001/XMLSchema" xmlns:xs="http://www.w3.org/2001/XMLSchema" xmlns:p="http://schemas.microsoft.com/office/2006/metadata/properties" xmlns:ns1="http://schemas.microsoft.com/sharepoint/v3" xmlns:ns2="71af3243-3dd4-4a8d-8c0d-dd76da1f02a5" xmlns:ns3="16c05727-aa75-4e4a-9b5f-8a80a1165891" xmlns:ns4="230e9df3-be65-4c73-a93b-d1236ebd677e" targetNamespace="http://schemas.microsoft.com/office/2006/metadata/properties" ma:root="true" ma:fieldsID="395891a93df65b14727750f2c06c306c" ns1:_="" ns2:_="" ns3:_="" ns4:_="">
-    <xsd:import namespace="http://schemas.microsoft.com/sharepoint/v3"/>
-    <xsd:import namespace="71af3243-3dd4-4a8d-8c0d-dd76da1f02a5"/>
-    <xsd:import namespace="16c05727-aa75-4e4a-9b5f-8a80a1165891"/>
-    <xsd:import namespace="230e9df3-be65-4c73-a93b-d1236ebd677e"/>
-    <xsd:element name="properties">
-      <xsd:complexType>
-        <xsd:sequence>
-          <xsd:element name="documentManagement">
-            <xsd:complexType>
-              <xsd:all>
-                <xsd:element ref="ns2:MediaServiceMetadata" minOccurs="0"/>
-                <xsd:element ref="ns2:MediaServiceFastMetadata" minOccurs="0"/>
-                <xsd:element ref="ns2:MediaServiceOCR" minOccurs="0"/>
-                <xsd:element ref="ns2:MediaServiceAutoTags" minOccurs="0"/>
-                <xsd:element ref="ns2:MediaServiceEventHashCode" minOccurs="0"/>
-                <xsd:element ref="ns2:MediaServiceGenerationTime" minOccurs="0"/>
-                <xsd:element ref="ns3:SharedWithUsers" minOccurs="0"/>
-                <xsd:element ref="ns3:SharedWithDetails" minOccurs="0"/>
-                <xsd:element ref="ns2:MediaServiceAutoKeyPoints" minOccurs="0"/>
-                <xsd:element ref="ns2:MediaServiceKeyPoints" minOccurs="0"/>
-                <xsd:element ref="ns2:MediaServiceDateTaken" minOccurs="0"/>
-                <xsd:element ref="ns2:Status" minOccurs="0"/>
-                <xsd:element ref="ns1:_ip_UnifiedCompliancePolicyProperties" minOccurs="0"/>
-                <xsd:element ref="ns1:_ip_UnifiedCompliancePolicyUIAction" minOccurs="0"/>
-                <xsd:element ref="ns2:Image" minOccurs="0"/>
-                <xsd:element ref="ns4:TaxCatchAll" minOccurs="0"/>
-                <xsd:element ref="ns2:ImageTagsTaxHTField" minOccurs="0"/>
-              </xsd:all>
-            </xsd:complexType>
-          </xsd:element>
-        </xsd:sequence>
-      </xsd:complexType>
-    </xsd:element>
-  </xsd:schema>
-  <xsd:schema xmlns:xsd="http://www.w3.org/2001/XMLSchema" xmlns:xs="http://www.w3.org/2001/XMLSchema" xmlns:dms="http://schemas.microsoft.com/office/2006/documentManagement/types" xmlns:pc="http://schemas.microsoft.com/office/infopath/2007/PartnerControls" targetNamespace="http://schemas.microsoft.com/sharepoint/v3" elementFormDefault="qualified">
-    <xsd:import namespace="http://schemas.microsoft.com/office/2006/documentManagement/types"/>
-    <xsd:import namespace="http://schemas.microsoft.com/office/infopath/2007/PartnerControls"/>
-    <xsd:element name="_ip_UnifiedCompliancePolicyProperties" ma:index="20" nillable="true" ma:displayName="Unified Compliance Policy Properties" ma:hidden="true" ma:internalName="_ip_UnifiedCompliancePolicyProperties">
-      <xsd:simpleType>
-        <xsd:restriction base="dms:Note"/>
-      </xsd:simpleType>
-    </xsd:element>
-    <xsd:element name="_ip_UnifiedCompliancePolicyUIAction" ma:index="21" nillable="true" ma:displayName="Unified Compliance Policy UI Action" ma:hidden="true" ma:internalName="_ip_UnifiedCompliancePolicyUIAction">
-      <xsd:simpleType>
-        <xsd:restriction base="dms:Text"/>
-      </xsd:simpleType>
-    </xsd:element>
-  </xsd:schema>
-  <xsd:schema xmlns:xsd="http://www.w3.org/2001/XMLSchema" xmlns:xs="http://www.w3.org/2001/XMLSchema" xmlns:dms="http://schemas.microsoft.com/office/2006/documentManagement/types" xmlns:pc="http://schemas.microsoft.com/office/infopath/2007/PartnerControls" targetNamespace="71af3243-3dd4-4a8d-8c0d-dd76da1f02a5" elementFormDefault="qualified">
-    <xsd:import namespace="http://schemas.microsoft.com/office/2006/documentManagement/types"/>
-    <xsd:import namespace="http://schemas.microsoft.com/office/infopath/2007/PartnerControls"/>
-    <xsd:element name="MediaServiceMetadata" ma:index="8" nillable="true" ma:displayName="MediaServiceMetadata" ma:hidden="true" ma:internalName="MediaServiceMetadata" ma:readOnly="true">
-      <xsd:simpleType>
-        <xsd:restriction base="dms:Note"/>
-      </xsd:simpleType>
-    </xsd:element>
-    <xsd:element name="MediaServiceFastMetadata" ma:index="9" nillable="true" ma:displayName="MediaServiceFastMetadata" ma:hidden="true" ma:internalName="MediaServiceFastMetadata" ma:readOnly="true">
-      <xsd:simpleType>
-        <xsd:restriction base="dms:Note"/>
-      </xsd:simpleType>
-    </xsd:element>
-    <xsd:element name="MediaServiceOCR" ma:index="10" nillable="true" ma:displayName="MediaServiceOCR" ma:internalName="MediaServiceOCR" ma:readOnly="true">
-      <xsd:simpleType>
-        <xsd:restriction base="dms:Note">
-          <xsd:maxLength value="255"/>
-        </xsd:restriction>
-      </xsd:simpleType>
-    </xsd:element>
-    <xsd:element name="MediaServiceAutoTags" ma:index="11" nillable="true" ma:displayName="MediaServiceAutoTags" ma:internalName="MediaServiceAutoTags" ma:readOnly="true">
-      <xsd:simpleType>
-        <xsd:restriction base="dms:Text"/>
-      </xsd:simpleType>
-    </xsd:element>
-    <xsd:element name="MediaServiceEventHashCode" ma:index="12" nillable="true" ma:displayName="MediaServiceEventHashCode" ma:hidden="true" ma:internalName="MediaServiceEventHashCode" ma:readOnly="true">
-      <xsd:simpleType>
-        <xsd:restriction base="dms:Text"/>
-      </xsd:simpleType>
-    </xsd:element>
-    <xsd:element name="MediaServiceGenerationTime" ma:index="13" nillable="true" ma:displayName="MediaServiceGenerationTime" ma:hidden="true" ma:internalName="MediaServiceGenerationTime" ma:readOnly="true">
-      <xsd:simpleType>
-        <xsd:restriction base="dms:Text"/>
-      </xsd:simpleType>
-    </xsd:element>
-    <xsd:element name="MediaServiceAutoKeyPoints" ma:index="16" nillable="true" ma:displayName="MediaServiceAutoKeyPoints" ma:hidden="true" ma:internalName="MediaServiceAutoKeyPoints" ma:readOnly="true">
-      <xsd:simpleType>
-        <xsd:restriction base="dms:Note"/>
-      </xsd:simpleType>
-    </xsd:element>
-    <xsd:element name="MediaServiceKeyPoints" ma:index="17" nillable="true" ma:displayName="KeyPoints" ma:internalName="MediaServiceKeyPoints" ma:readOnly="false">
-      <xsd:simpleType>
-        <xsd:restriction base="dms:Note">
-          <xsd:maxLength value="255"/>
-        </xsd:restriction>
-      </xsd:simpleType>
-    </xsd:element>
-    <xsd:element name="MediaServiceDateTaken" ma:index="18" nillable="true" ma:displayName="MediaServiceDateTaken" ma:hidden="true" ma:internalName="MediaServiceDateTaken" ma:readOnly="true">
-      <xsd:simpleType>
-        <xsd:restriction base="dms:Text"/>
-      </xsd:simpleType>
-    </xsd:element>
-    <xsd:element name="Status" ma:index="19" nillable="true" ma:displayName="Status" ma:default="Not started" ma:format="Dropdown" ma:internalName="Status">
-      <xsd:simpleType>
-        <xsd:restriction base="dms:Choice">
-          <xsd:enumeration value="Not started"/>
-          <xsd:enumeration value="In Progress"/>
-          <xsd:enumeration value="Completed"/>
-        </xsd:restriction>
-      </xsd:simpleType>
-    </xsd:element>
-    <xsd:element name="Image" ma:index="22" nillable="true" ma:displayName="Image" ma:format="Image" ma:internalName="Image">
-      <xsd:complexType>
-        <xsd:complexContent>
-          <xsd:extension base="dms:URL">
-            <xsd:sequence>
-              <xsd:element name="Url" type="dms:ValidUrl" minOccurs="0" nillable="true"/>
-              <xsd:element name="Description" type="xsd:string" nillable="true"/>
-            </xsd:sequence>
-          </xsd:extension>
-        </xsd:complexContent>
-      </xsd:complexType>
-    </xsd:element>
-    <xsd:element name="ImageTagsTaxHTField" ma:index="25" nillable="true" ma:taxonomy="true" ma:internalName="ImageTagsTaxHTField" ma:taxonomyFieldName="MediaServiceImageTags" ma:displayName="Image Tags" ma:readOnly="false" ma:fieldId="{5cf76f15-5ced-4ddc-b409-7134ff3c332f}" ma:taxonomyMulti="true" ma:sspId="e385fb40-52d4-4fae-9c5b-3e8ff8a5878e" ma:termSetId="09814cd3-568e-fe90-9814-8d621ff8fb84" ma:anchorId="fba54fb3-c3e1-fe81-a776-ca4b69148c4d" ma:open="true" ma:isKeyword="false">
-      <xsd:complexType>
-        <xsd:sequence>
-          <xsd:element ref="pc:Terms" minOccurs="0" maxOccurs="1"/>
-        </xsd:sequence>
-      </xsd:complexType>
-    </xsd:element>
-  </xsd:schema>
-  <xsd:schema xmlns:xsd="http://www.w3.org/2001/XMLSchema" xmlns:xs="http://www.w3.org/2001/XMLSchema" xmlns:dms="http://schemas.microsoft.com/office/2006/documentManagement/types" xmlns:pc="http://schemas.microsoft.com/office/infopath/2007/PartnerControls" targetNamespace="16c05727-aa75-4e4a-9b5f-8a80a1165891" elementFormDefault="qualified">
-    <xsd:import namespace="http://schemas.microsoft.com/office/2006/documentManagement/types"/>
-    <xsd:import namespace="http://schemas.microsoft.com/office/infopath/2007/PartnerControls"/>
-    <xsd:element name="SharedWithUsers" ma:index="14" nillable="true" ma:displayName="Shared With" ma:internalName="SharedWithUsers" ma:readOnly="true">
-      <xsd:complexType>
-        <xsd:complexContent>
-          <xsd:extension base="dms:UserMulti">
-            <xsd:sequence>
-              <xsd:element name="UserInfo" minOccurs="0" maxOccurs="unbounded">
-                <xsd:complexType>
-                  <xsd:sequence>
-                    <xsd:element name="DisplayName" type="xsd:string" minOccurs="0"/>
-                    <xsd:element name="AccountId" type="dms:UserId" minOccurs="0" nillable="true"/>
-                    <xsd:element name="AccountType" type="xsd:string" minOccurs="0"/>
-                  </xsd:sequence>
-                </xsd:complexType>
-              </xsd:element>
-            </xsd:sequence>
-          </xsd:extension>
-        </xsd:complexContent>
-      </xsd:complexType>
-    </xsd:element>
-    <xsd:element name="SharedWithDetails" ma:index="15" nillable="true" ma:displayName="Shared With Details" ma:internalName="SharedWithDetails" ma:readOnly="true">
-      <xsd:simpleType>
-        <xsd:restriction base="dms:Note">
-          <xsd:maxLength value="255"/>
-        </xsd:restriction>
-      </xsd:simpleType>
-    </xsd:element>
-  </xsd:schema>
-  <xsd:schema xmlns:xsd="http://www.w3.org/2001/XMLSchema" xmlns:xs="http://www.w3.org/2001/XMLSchema" xmlns:dms="http://schemas.microsoft.com/office/2006/documentManagement/types" xmlns:pc="http://schemas.microsoft.com/office/infopath/2007/PartnerControls" targetNamespace="230e9df3-be65-4c73-a93b-d1236ebd677e" elementFormDefault="qualified">
-    <xsd:import namespace="http://schemas.microsoft.com/office/2006/documentManagement/types"/>
-    <xsd:import namespace="http://schemas.microsoft.com/office/infopath/2007/PartnerControls"/>
-    <xsd:element name="TaxCatchAll" ma:index="23" nillable="true" ma:displayName="Taxonomy Catch All Column" ma:hidden="true" ma:list="{3f6bfcbc-3db3-4ae6-bd76-326f0798ad28}" ma:internalName="TaxCatchAll" ma:showField="CatchAllData" ma:web="16c05727-aa75-4e4a-9b5f-8a80a1165891">
-      <xsd:complexType>
-        <xsd:complexContent>
-          <xsd:extension base="dms:MultiChoiceLookup">
-            <xsd:sequence>
-              <xsd:element name="Value" type="dms:Lookup" maxOccurs="unbounded" minOccurs="0" nillable="true"/>
-            </xsd:sequence>
-          </xsd:extension>
-        </xsd:complexContent>
-      </xsd:complexType>
-    </xsd:element>
-  </xsd:schema>
-  <xsd:schema xmlns="http://schemas.openxmlformats.org/package/2006/metadata/core-properties" xmlns:xsd="http://www.w3.org/2001/XMLSchema" xmlns:xsi="http://www.w3.org/2001/XMLSchema-instance" xmlns:dc="http://purl.org/dc/elements/1.1/" xmlns:dcterms="http://purl.org/dc/terms/" xmlns:odoc="http://schemas.microsoft.com/internal/obd" targetNamespace="http://schemas.openxmlformats.org/package/2006/metadata/core-properties" elementFormDefault="qualified" attributeFormDefault="unqualified" blockDefault="#all">
-    <xsd:import namespace="http://purl.org/dc/elements/1.1/" schemaLocation="http://dublincore.org/schemas/xmls/qdc/2003/04/02/dc.xsd"/>
-    <xsd:import namespace="http://purl.org/dc/terms/" schemaLocation="http://dublincore.org/schemas/xmls/qdc/2003/04/02/dcterms.xsd"/>
-    <xsd:element name="coreProperties" type="CT_coreProperties"/>
-    <xsd:complexType name="CT_coreProperties">
-      <xsd:all>
-        <xsd:element ref="dc:creator" minOccurs="0" maxOccurs="1"/>
-        <xsd:element ref="dcterms:created" minOccurs="0" maxOccurs="1"/>
-        <xsd:element ref="dc:identifier" minOccurs="0" maxOccurs="1"/>
-        <xsd:element name="contentType" minOccurs="0" maxOccurs="1" type="xsd:string" ma:index="0" ma:displayName="Content Type"/>
-        <xsd:element ref="dc:title" minOccurs="0" maxOccurs="1" ma:index="4" ma:displayName="Title"/>
-        <xsd:element ref="dc:subject" minOccurs="0" maxOccurs="1"/>
-        <xsd:element ref="dc:description" minOccurs="0" maxOccurs="1"/>
-        <xsd:element name="keywords" minOccurs="0" maxOccurs="1" type="xsd:string"/>
-        <xsd:element ref="dc:language" minOccurs="0" maxOccurs="1"/>
-        <xsd:element name="category" minOccurs="0" maxOccurs="1" type="xsd:string"/>
-        <xsd:element name="version" minOccurs="0" maxOccurs="1" type="xsd:string"/>
-        <xsd:element name="revision" minOccurs="0" maxOccurs="1" type="xsd:string">
-          <xsd:annotation>
-            <xsd:documentation>
-                        This value indicates the number of saves or revisions. The application is responsible for updating this value after each revision.
-                    </xsd:documentation>
-          </xsd:annotation>
-        </xsd:element>
-        <xsd:element name="lastModifiedBy" minOccurs="0" maxOccurs="1" type="xsd:string"/>
-        <xsd:element ref="dcterms:modified" minOccurs="0" maxOccurs="1"/>
-        <xsd:element name="contentStatus" minOccurs="0" maxOccurs="1" type="xsd:string"/>
-      </xsd:all>
-    </xsd:complexType>
-  </xsd:schema>
-  <xs:schema xmlns:pc="http://schemas.microsoft.com/office/infopath/2007/PartnerControls" xmlns:xs="http://www.w3.org/2001/XMLSchema" targetNamespace="http://schemas.microsoft.com/office/infopath/2007/PartnerControls" elementFormDefault="qualified" attributeFormDefault="unqualified">
-    <xs:element name="Person">
-      <xs:complexType>
-        <xs:sequence>
-          <xs:element ref="pc:DisplayName" minOccurs="0"/>
-          <xs:element ref="pc:AccountId" minOccurs="0"/>
-          <xs:element ref="pc:AccountType" minOccurs="0"/>
-        </xs:sequence>
-      </xs:complexType>
-    </xs:element>
-    <xs:element name="DisplayName" type="xs:string"/>
-    <xs:element name="AccountId" type="xs:string"/>
-    <xs:element name="AccountType" type="xs:string"/>
-    <xs:element name="BDCAssociatedEntity">
-      <xs:complexType>
-        <xs:sequence>
-          <xs:element ref="pc:BDCEntity" minOccurs="0" maxOccurs="unbounded"/>
-        </xs:sequence>
-        <xs:attribute ref="pc:EntityNamespace"/>
-        <xs:attribute ref="pc:EntityName"/>
-        <xs:attribute ref="pc:SystemInstanceName"/>
-        <xs:attribute ref="pc:AssociationName"/>
-      </xs:complexType>
-    </xs:element>
-    <xs:attribute name="EntityNamespace" type="xs:string"/>
-    <xs:attribute name="EntityName" type="xs:string"/>
-    <xs:attribute name="SystemInstanceName" type="xs:string"/>
-    <xs:attribute name="AssociationName" type="xs:string"/>
-    <xs:element name="BDCEntity">
-      <xs:complexType>
-        <xs:sequence>
-          <xs:element ref="pc:EntityDisplayName" minOccurs="0"/>
-          <xs:element ref="pc:EntityInstanceReference" minOccurs="0"/>
-          <xs:element ref="pc:EntityId1" minOccurs="0"/>
-          <xs:element ref="pc:EntityId2" minOccurs="0"/>
-          <xs:element ref="pc:EntityId3" minOccurs="0"/>
-          <xs:element ref="pc:EntityId4" minOccurs="0"/>
-          <xs:element ref="pc:EntityId5" minOccurs="0"/>
-        </xs:sequence>
-      </xs:complexType>
-    </xs:element>
-    <xs:element name="EntityDisplayName" type="xs:string"/>
-    <xs:element name="EntityInstanceReference" type="xs:string"/>
-    <xs:element name="EntityId1" type="xs:string"/>
-    <xs:element name="EntityId2" type="xs:string"/>
-    <xs:element name="EntityId3" type="xs:string"/>
-    <xs:element name="EntityId4" type="xs:string"/>
-    <xs:element name="EntityId5" type="xs:string"/>
-    <xs:element name="Terms">
-      <xs:complexType>
-        <xs:sequence>
-          <xs:element ref="pc:TermInfo" minOccurs="0" maxOccurs="unbounded"/>
-        </xs:sequence>
-      </xs:complexType>
-    </xs:element>
-    <xs:element name="TermInfo">
-      <xs:complexType>
-        <xs:sequence>
-          <xs:element ref="pc:TermName" minOccurs="0"/>
-          <xs:element ref="pc:TermId" minOccurs="0"/>
-        </xs:sequence>
-      </xs:complexType>
-    </xs:element>
-    <xs:element name="TermName" type="xs:string"/>
-    <xs:element name="TermId" type="xs:string"/>
-  </xs:schema>
-</ct:contentTypeSchema>
-</file>
-
-<file path=customXml/item2.xml><?xml version="1.0" encoding="utf-8"?>
-<?mso-contentType ?>
-<FormTemplates xmlns="http://schemas.microsoft.com/sharepoint/v3/contenttype/forms">
-  <Display>DocumentLibraryForm</Display>
-  <Edit>DocumentLibraryForm</Edit>
-  <New>DocumentLibraryForm</New>
-</FormTemplates>
-</file>
-
-<file path=customXml/item3.xml><?xml version="1.0" encoding="utf-8"?>
-<p:properties xmlns:p="http://schemas.microsoft.com/office/2006/metadata/properties" xmlns:xsi="http://www.w3.org/2001/XMLSchema-instance" xmlns:pc="http://schemas.microsoft.com/office/infopath/2007/PartnerControls">
-  <documentManagement>
-    <_ip_UnifiedCompliancePolicyUIAction xmlns="http://schemas.microsoft.com/sharepoint/v3" xsi:nil="true"/>
-    <Image xmlns="71af3243-3dd4-4a8d-8c0d-dd76da1f02a5">
-      <Url xsi:nil="true"/>
-      <Description xsi:nil="true"/>
-    </Image>
-    <Status xmlns="71af3243-3dd4-4a8d-8c0d-dd76da1f02a5">Not started</Status>
-    <_ip_UnifiedCompliancePolicyProperties xmlns="http://schemas.microsoft.com/sharepoint/v3" xsi:nil="true"/>
-    <ImageTagsTaxHTField xmlns="71af3243-3dd4-4a8d-8c0d-dd76da1f02a5">
-      <Terms xmlns="http://schemas.microsoft.com/office/infopath/2007/PartnerControls"/>
-    </ImageTagsTaxHTField>
-    <TaxCatchAll xmlns="230e9df3-be65-4c73-a93b-d1236ebd677e"/>
-    <MediaServiceKeyPoints xmlns="71af3243-3dd4-4a8d-8c0d-dd76da1f02a5" xsi:nil="true"/>
-  </documentManagement>
-</p:properties>
-</file>
-
-<file path=customXml/itemProps1.xml><?xml version="1.0" encoding="utf-8"?>
-<ds:datastoreItem xmlns:ds="http://schemas.openxmlformats.org/officeDocument/2006/customXml" ds:itemID="{CC96B61E-1B64-430F-934F-7D1B90028029}">
-  <ds:schemaRefs>
-    <ds:schemaRef ds:uri="http://schemas.microsoft.com/office/2006/metadata/contentType"/>
-    <ds:schemaRef ds:uri="http://schemas.microsoft.com/office/2006/metadata/properties/metaAttributes"/>
-    <ds:schemaRef ds:uri="http://www.w3.org/2001/XMLSchema"/>
-    <ds:schemaRef ds:uri="http://schemas.microsoft.com/office/2006/metadata/properties"/>
-    <ds:schemaRef ds:uri="http://schemas.microsoft.com/sharepoint/v3"/>
-    <ds:schemaRef ds:uri="71af3243-3dd4-4a8d-8c0d-dd76da1f02a5"/>
-    <ds:schemaRef ds:uri="16c05727-aa75-4e4a-9b5f-8a80a1165891"/>
-    <ds:schemaRef ds:uri="230e9df3-be65-4c73-a93b-d1236ebd677e"/>
-    <ds:schemaRef ds:uri="http://schemas.microsoft.com/office/2006/documentManagement/types"/>
-    <ds:schemaRef ds:uri="http://schemas.microsoft.com/office/infopath/2007/PartnerControls"/>
-    <ds:schemaRef ds:uri="http://schemas.openxmlformats.org/package/2006/metadata/core-properties"/>
-    <ds:schemaRef ds:uri="http://purl.org/dc/elements/1.1/"/>
-    <ds:schemaRef ds:uri="http://purl.org/dc/terms/"/>
-    <ds:schemaRef ds:uri="http://schemas.microsoft.com/internal/obd"/>
-  </ds:schemaRefs>
-</ds:datastoreItem>
-</file>
-
-<file path=customXml/itemProps2.xml><?xml version="1.0" encoding="utf-8"?>
-<ds:datastoreItem xmlns:ds="http://schemas.openxmlformats.org/officeDocument/2006/customXml" ds:itemID="{0FD6FE22-81A0-4500-AFD0-342D21BB9A2C}">
-  <ds:schemaRefs>
-    <ds:schemaRef ds:uri="http://schemas.microsoft.com/sharepoint/v3/contenttype/forms"/>
-  </ds:schemaRefs>
-</ds:datastoreItem>
-</file>
-
-<file path=customXml/itemProps3.xml><?xml version="1.0" encoding="utf-8"?>
-<ds:datastoreItem xmlns:ds="http://schemas.openxmlformats.org/officeDocument/2006/customXml" ds:itemID="{29C43685-694E-4579-B109-3C418D49DA65}">
-  <ds:schemaRefs>
-    <ds:schemaRef ds:uri="http://schemas.microsoft.com/office/2006/metadata/properties"/>
-    <ds:schemaRef ds:uri="http://schemas.microsoft.com/office/infopath/2007/PartnerControls"/>
-    <ds:schemaRef ds:uri="http://schemas.microsoft.com/sharepoint/v3"/>
-    <ds:schemaRef ds:uri="71af3243-3dd4-4a8d-8c0d-dd76da1f02a5"/>
-    <ds:schemaRef ds:uri="230e9df3-be65-4c73-a93b-d1236ebd677e"/>
-  </ds:schemaRefs>
-</ds:datastoreItem>
 </file>
</xml_diff>